<commit_message>
Changes to Description and Sprint backlog
</commit_message>
<xml_diff>
--- a/Software Presentation.pptx
+++ b/Software Presentation.pptx
@@ -8920,7 +8920,7 @@
           <a:p>
             <a:fld id="{6AD6EE87-EBD5-4F12-A48A-63ACA297AC8F}" type="datetimeFigureOut">
               <a:rPr lang="en-US" dirty="0"/>
-              <a:t>11/12/2019</a:t>
+              <a:t>11/13/2019</a:t>
             </a:fld>
             <a:endParaRPr lang="en-US" dirty="0"/>
           </a:p>
@@ -9122,7 +9122,7 @@
           <a:p>
             <a:fld id="{4CD73815-2707-4475-8F1A-B873CB631BB4}" type="datetimeFigureOut">
               <a:rPr lang="en-US" dirty="0"/>
-              <a:t>11/12/2019</a:t>
+              <a:t>11/13/2019</a:t>
             </a:fld>
             <a:endParaRPr lang="en-US" dirty="0"/>
           </a:p>
@@ -9297,7 +9297,7 @@
           <a:p>
             <a:fld id="{2A4AFB99-0EAB-4182-AFF8-E214C82A68F6}" type="datetimeFigureOut">
               <a:rPr lang="en-US" dirty="0"/>
-              <a:t>11/12/2019</a:t>
+              <a:t>11/13/2019</a:t>
             </a:fld>
             <a:endParaRPr lang="en-US" dirty="0"/>
           </a:p>
@@ -9497,7 +9497,7 @@
           <a:p>
             <a:fld id="{A5D3794B-289A-4A80-97D7-111025398D45}" type="datetimeFigureOut">
               <a:rPr lang="en-US" dirty="0"/>
-              <a:t>11/12/2019</a:t>
+              <a:t>11/13/2019</a:t>
             </a:fld>
             <a:endParaRPr lang="en-US" dirty="0"/>
           </a:p>
@@ -18390,7 +18390,7 @@
           <a:p>
             <a:fld id="{5A61015F-7CC6-4D0A-9D87-873EA4C304CC}" type="datetimeFigureOut">
               <a:rPr lang="en-US" dirty="0"/>
-              <a:t>11/12/2019</a:t>
+              <a:t>11/13/2019</a:t>
             </a:fld>
             <a:endParaRPr lang="en-US" dirty="0"/>
           </a:p>
@@ -18659,7 +18659,7 @@
           <a:p>
             <a:fld id="{93C6A301-0538-44EC-B09D-202E1042A48B}" type="datetimeFigureOut">
               <a:rPr lang="en-US" dirty="0"/>
-              <a:t>11/12/2019</a:t>
+              <a:t>11/13/2019</a:t>
             </a:fld>
             <a:endParaRPr lang="en-US" dirty="0"/>
           </a:p>
@@ -19052,7 +19052,7 @@
           <a:p>
             <a:fld id="{D789574A-8875-45EF-8EA2-3CAA0F7ABC4C}" type="datetimeFigureOut">
               <a:rPr lang="en-US" dirty="0"/>
-              <a:t>11/12/2019</a:t>
+              <a:t>11/13/2019</a:t>
             </a:fld>
             <a:endParaRPr lang="en-US" dirty="0"/>
           </a:p>
@@ -19165,7 +19165,7 @@
           <a:p>
             <a:fld id="{67EF4D4C-5367-4C26-9E2B-D8088D7FCA81}" type="datetimeFigureOut">
               <a:rPr lang="en-US" dirty="0"/>
-              <a:t>11/12/2019</a:t>
+              <a:t>11/13/2019</a:t>
             </a:fld>
             <a:endParaRPr lang="en-US" dirty="0"/>
           </a:p>
@@ -19255,7 +19255,7 @@
           <a:p>
             <a:fld id="{56E91E96-98B0-4413-9547-46F3504108EF}" type="datetimeFigureOut">
               <a:rPr lang="en-US" dirty="0"/>
-              <a:t>11/12/2019</a:t>
+              <a:t>11/13/2019</a:t>
             </a:fld>
             <a:endParaRPr lang="en-US" dirty="0"/>
           </a:p>
@@ -19540,7 +19540,7 @@
           <a:p>
             <a:fld id="{05C68B11-C5A8-448C-8CE9-B1A273C79CFC}" type="datetimeFigureOut">
               <a:rPr lang="en-US" dirty="0"/>
-              <a:t>11/12/2019</a:t>
+              <a:t>11/13/2019</a:t>
             </a:fld>
             <a:endParaRPr lang="en-US" dirty="0"/>
           </a:p>
@@ -19815,7 +19815,7 @@
           <a:p>
             <a:fld id="{C7616CA0-919D-4A49-9C8A-62FDFB3A5183}" type="datetimeFigureOut">
               <a:rPr lang="en-US" dirty="0"/>
-              <a:t>11/12/2019</a:t>
+              <a:t>11/13/2019</a:t>
             </a:fld>
             <a:endParaRPr lang="en-US" dirty="0"/>
           </a:p>
@@ -20061,7 +20061,7 @@
             <a:fld id="{90298CD5-6C1E-4009-B41F-6DF62E31D3BE}" type="datetimeFigureOut">
               <a:rPr lang="en-US" dirty="0"/>
               <a:pPr/>
-              <a:t>11/12/2019</a:t>
+              <a:t>11/13/2019</a:t>
             </a:fld>
             <a:endParaRPr lang="en-US" dirty="0"/>
           </a:p>
@@ -23204,13 +23204,13 @@
             <p:ph idx="1"/>
             <p:extLst>
               <p:ext uri="{D42A27DB-BD31-4B8C-83A1-F6EECF244321}">
-                <p14:modId xmlns:p14="http://schemas.microsoft.com/office/powerpoint/2010/main" val="1002270686"/>
+                <p14:modId xmlns:p14="http://schemas.microsoft.com/office/powerpoint/2010/main" val="4085412977"/>
               </p:ext>
             </p:extLst>
           </p:nvPr>
         </p:nvGraphicFramePr>
         <p:xfrm>
-          <a:off x="5710845" y="846841"/>
+          <a:off x="5668032" y="724515"/>
           <a:ext cx="5700798" cy="6099177"/>
         </p:xfrm>
         <a:graphic>
@@ -23534,7 +23534,7 @@
                         <a:rPr lang="en-GB" sz="1100" dirty="0" smtClean="0">
                           <a:effectLst/>
                         </a:rPr>
-                        <a:t>8</a:t>
+                        <a:t>20</a:t>
                       </a:r>
                       <a:endParaRPr lang="en-GB" sz="1100" dirty="0">
                         <a:effectLst/>
@@ -23745,7 +23745,7 @@
                         <a:rPr lang="en-GB" sz="1100" dirty="0" smtClean="0">
                           <a:effectLst/>
                         </a:rPr>
-                        <a:t>1</a:t>
+                        <a:t>5</a:t>
                       </a:r>
                       <a:endParaRPr lang="en-GB" sz="1100" dirty="0">
                         <a:effectLst/>
@@ -23985,7 +23985,7 @@
                         <a:rPr lang="en-GB" sz="1100" dirty="0" smtClean="0">
                           <a:effectLst/>
                         </a:rPr>
-                        <a:t>10</a:t>
+                        <a:t>15</a:t>
                       </a:r>
                       <a:endParaRPr lang="en-GB" sz="1100" dirty="0">
                         <a:effectLst/>
@@ -24171,7 +24171,7 @@
                         <a:rPr lang="en-GB" sz="1100" dirty="0" smtClean="0">
                           <a:effectLst/>
                         </a:rPr>
-                        <a:t>3</a:t>
+                        <a:t>10</a:t>
                       </a:r>
                       <a:endParaRPr lang="en-GB" sz="1100" dirty="0">
                         <a:effectLst/>
@@ -24338,7 +24338,7 @@
                         <a:rPr lang="en-GB" sz="1100" dirty="0" smtClean="0">
                           <a:effectLst/>
                         </a:rPr>
-                        <a:t>15</a:t>
+                        <a:t>25</a:t>
                       </a:r>
                       <a:endParaRPr lang="en-GB" sz="1100" dirty="0">
                         <a:effectLst/>
@@ -24364,12 +24364,12 @@
                         </a:spcAft>
                       </a:pPr>
                       <a:r>
-                        <a:rPr lang="en-GB" sz="1100">
+                        <a:rPr lang="en-GB" sz="1100" dirty="0">
                           <a:effectLst/>
                         </a:rPr>
                         <a:t>5</a:t>
                       </a:r>
-                      <a:endParaRPr lang="en-GB" sz="1100">
+                      <a:endParaRPr lang="en-GB" sz="1100" dirty="0">
                         <a:effectLst/>
                         <a:latin typeface="Calibri" panose="020F0502020204030204" pitchFamily="34" charset="0"/>
                         <a:ea typeface="Calibri" panose="020F0502020204030204" pitchFamily="34" charset="0"/>
@@ -24400,12 +24400,12 @@
                         </a:spcAft>
                       </a:pPr>
                       <a:r>
-                        <a:rPr lang="en-GB" sz="1100">
+                        <a:rPr lang="en-GB" sz="1100" dirty="0">
                           <a:effectLst/>
                         </a:rPr>
                         <a:t>6</a:t>
                       </a:r>
-                      <a:endParaRPr lang="en-GB" sz="1100">
+                      <a:endParaRPr lang="en-GB" sz="1100" dirty="0">
                         <a:effectLst/>
                         <a:latin typeface="Calibri" panose="020F0502020204030204" pitchFamily="34" charset="0"/>
                         <a:ea typeface="Calibri" panose="020F0502020204030204" pitchFamily="34" charset="0"/>
@@ -24515,16 +24515,10 @@
                         </a:spcAft>
                       </a:pPr>
                       <a:r>
-                        <a:rPr lang="en-GB" sz="1100" dirty="0">
-                          <a:effectLst/>
-                        </a:rPr>
-                        <a:t> </a:t>
-                      </a:r>
-                      <a:r>
                         <a:rPr lang="en-GB" sz="1100" dirty="0" smtClean="0">
                           <a:effectLst/>
                         </a:rPr>
-                        <a:t>15</a:t>
+                        <a:t>25</a:t>
                       </a:r>
                       <a:endParaRPr lang="en-GB" sz="1100" dirty="0">
                         <a:effectLst/>

</xml_diff>